<commit_message>
Lagt till ett mellanslag
</commit_message>
<xml_diff>
--- a/GIT.pptx
+++ b/GIT.pptx
@@ -121,14 +121,6 @@
 </p:presentation>
 </file>
 
-<file path=ppt/revisionInfo.xml><?xml version="1.0" encoding="utf-8"?>
-<p1510:revInfo xmlns:a="http://schemas.openxmlformats.org/drawingml/2006/main" xmlns:r="http://schemas.openxmlformats.org/officeDocument/2006/relationships" xmlns:p1510="http://schemas.microsoft.com/office/powerpoint/2015/10/main">
-  <p1510:revLst>
-    <p1510:client id="{BAAC4344-2677-453C-8CCE-6DDB104C1213}" v="2" dt="2020-02-17T08:12:53.656"/>
-  </p1510:revLst>
-</p1510:revInfo>
-</file>
-
 <file path=ppt/changesInfos/changesInfo1.xml><?xml version="1.0" encoding="utf-8"?>
 <pc:chgInfo xmlns:a="http://schemas.openxmlformats.org/drawingml/2006/main" xmlns:r="http://schemas.openxmlformats.org/officeDocument/2006/relationships" xmlns:ac="http://schemas.microsoft.com/office/drawing/2013/main/command" xmlns:pc="http://schemas.microsoft.com/office/powerpoint/2013/main/command">
   <pc:docChgLst>
@@ -249,6 +241,30 @@
             <pc:docMk/>
             <pc:sldMk cId="324241722" sldId="265"/>
             <ac:spMk id="3" creationId="{A853BBB5-84A8-420E-96F9-CB2359DA4FDF}"/>
+          </ac:spMkLst>
+        </pc:spChg>
+      </pc:sldChg>
+    </pc:docChg>
+  </pc:docChgLst>
+  <pc:docChgLst>
+    <pc:chgData name="Mikael Engstrom" userId="90b90ffa872b0294" providerId="LiveId" clId="{6D6D61C8-FB20-4A35-93D4-12B734C5B4D3}"/>
+    <pc:docChg chg="modSld">
+      <pc:chgData name="Mikael Engstrom" userId="90b90ffa872b0294" providerId="LiveId" clId="{6D6D61C8-FB20-4A35-93D4-12B734C5B4D3}" dt="2020-09-09T19:49:57.149" v="0" actId="20577"/>
+      <pc:docMkLst>
+        <pc:docMk/>
+      </pc:docMkLst>
+      <pc:sldChg chg="modSp mod">
+        <pc:chgData name="Mikael Engstrom" userId="90b90ffa872b0294" providerId="LiveId" clId="{6D6D61C8-FB20-4A35-93D4-12B734C5B4D3}" dt="2020-09-09T19:49:57.149" v="0" actId="20577"/>
+        <pc:sldMkLst>
+          <pc:docMk/>
+          <pc:sldMk cId="3741574052" sldId="261"/>
+        </pc:sldMkLst>
+        <pc:spChg chg="mod">
+          <ac:chgData name="Mikael Engstrom" userId="90b90ffa872b0294" providerId="LiveId" clId="{6D6D61C8-FB20-4A35-93D4-12B734C5B4D3}" dt="2020-09-09T19:49:57.149" v="0" actId="20577"/>
+          <ac:spMkLst>
+            <pc:docMk/>
+            <pc:sldMk cId="3741574052" sldId="261"/>
+            <ac:spMk id="3" creationId="{7A7889F7-8E26-4C24-B383-4A6204D41D39}"/>
           </ac:spMkLst>
         </pc:spChg>
       </pc:sldChg>
@@ -982,7 +998,7 @@
           <a:p>
             <a:fld id="{25AD8EE4-2DB4-48E2-B9DD-EC94B1BCA765}" type="datetimeFigureOut">
               <a:rPr lang="LID4096" smtClean="0"/>
-              <a:t>02/12/2020</a:t>
+              <a:t>09/09/2020</a:t>
             </a:fld>
             <a:endParaRPr lang="LID4096"/>
           </a:p>
@@ -1184,7 +1200,7 @@
           <a:p>
             <a:fld id="{25AD8EE4-2DB4-48E2-B9DD-EC94B1BCA765}" type="datetimeFigureOut">
               <a:rPr lang="LID4096" smtClean="0"/>
-              <a:t>02/12/2020</a:t>
+              <a:t>09/09/2020</a:t>
             </a:fld>
             <a:endParaRPr lang="LID4096"/>
           </a:p>
@@ -1364,7 +1380,7 @@
           <a:p>
             <a:fld id="{25AD8EE4-2DB4-48E2-B9DD-EC94B1BCA765}" type="datetimeFigureOut">
               <a:rPr lang="LID4096" smtClean="0"/>
-              <a:t>02/12/2020</a:t>
+              <a:t>09/09/2020</a:t>
             </a:fld>
             <a:endParaRPr lang="LID4096"/>
           </a:p>
@@ -1534,7 +1550,7 @@
           <a:p>
             <a:fld id="{25AD8EE4-2DB4-48E2-B9DD-EC94B1BCA765}" type="datetimeFigureOut">
               <a:rPr lang="LID4096" smtClean="0"/>
-              <a:t>02/12/2020</a:t>
+              <a:t>09/09/2020</a:t>
             </a:fld>
             <a:endParaRPr lang="LID4096"/>
           </a:p>
@@ -2105,7 +2121,7 @@
           <a:p>
             <a:fld id="{25AD8EE4-2DB4-48E2-B9DD-EC94B1BCA765}" type="datetimeFigureOut">
               <a:rPr lang="LID4096" smtClean="0"/>
-              <a:t>02/12/2020</a:t>
+              <a:t>09/09/2020</a:t>
             </a:fld>
             <a:endParaRPr lang="LID4096"/>
           </a:p>
@@ -2407,7 +2423,7 @@
           <a:p>
             <a:fld id="{25AD8EE4-2DB4-48E2-B9DD-EC94B1BCA765}" type="datetimeFigureOut">
               <a:rPr lang="LID4096" smtClean="0"/>
-              <a:t>02/12/2020</a:t>
+              <a:t>09/09/2020</a:t>
             </a:fld>
             <a:endParaRPr lang="LID4096"/>
           </a:p>
@@ -2844,7 +2860,7 @@
           <a:p>
             <a:fld id="{25AD8EE4-2DB4-48E2-B9DD-EC94B1BCA765}" type="datetimeFigureOut">
               <a:rPr lang="LID4096" smtClean="0"/>
-              <a:t>02/12/2020</a:t>
+              <a:t>09/09/2020</a:t>
             </a:fld>
             <a:endParaRPr lang="LID4096"/>
           </a:p>
@@ -2962,7 +2978,7 @@
           <a:p>
             <a:fld id="{25AD8EE4-2DB4-48E2-B9DD-EC94B1BCA765}" type="datetimeFigureOut">
               <a:rPr lang="LID4096" smtClean="0"/>
-              <a:t>02/12/2020</a:t>
+              <a:t>09/09/2020</a:t>
             </a:fld>
             <a:endParaRPr lang="LID4096"/>
           </a:p>
@@ -3057,7 +3073,7 @@
           <a:p>
             <a:fld id="{25AD8EE4-2DB4-48E2-B9DD-EC94B1BCA765}" type="datetimeFigureOut">
               <a:rPr lang="LID4096" smtClean="0"/>
-              <a:t>02/12/2020</a:t>
+              <a:t>09/09/2020</a:t>
             </a:fld>
             <a:endParaRPr lang="LID4096"/>
           </a:p>
@@ -3439,7 +3455,7 @@
           <a:p>
             <a:fld id="{25AD8EE4-2DB4-48E2-B9DD-EC94B1BCA765}" type="datetimeFigureOut">
               <a:rPr lang="LID4096" smtClean="0"/>
-              <a:t>02/12/2020</a:t>
+              <a:t>09/09/2020</a:t>
             </a:fld>
             <a:endParaRPr lang="LID4096"/>
           </a:p>
@@ -3833,7 +3849,7 @@
           <a:p>
             <a:fld id="{25AD8EE4-2DB4-48E2-B9DD-EC94B1BCA765}" type="datetimeFigureOut">
               <a:rPr lang="LID4096" smtClean="0"/>
-              <a:t>02/12/2020</a:t>
+              <a:t>09/09/2020</a:t>
             </a:fld>
             <a:endParaRPr lang="LID4096"/>
           </a:p>
@@ -4146,7 +4162,7 @@
           <a:p>
             <a:fld id="{25AD8EE4-2DB4-48E2-B9DD-EC94B1BCA765}" type="datetimeFigureOut">
               <a:rPr lang="LID4096" smtClean="0"/>
-              <a:t>02/12/2020</a:t>
+              <a:t>09/09/2020</a:t>
             </a:fld>
             <a:endParaRPr lang="LID4096"/>
           </a:p>
@@ -5015,7 +5031,11 @@
             </a:r>
             <a:r>
               <a:rPr lang="en-US" dirty="0"/>
-              <a:t>*t": when it breaks</a:t>
+              <a:t>*t": when </a:t>
+            </a:r>
+            <a:r>
+              <a:rPr lang="en-US"/>
+              <a:t>it breaks </a:t>
             </a:r>
             <a:endParaRPr lang="LID4096" dirty="0"/>
           </a:p>

</xml_diff>